<commit_message>
Add RNA-seq flow chart.
</commit_message>
<xml_diff>
--- a/LectureFiles/cshl/2015/RNASeq_Module3_Tutorial.pptx
+++ b/LectureFiles/cshl/2015/RNASeq_Module3_Tutorial.pptx
@@ -5,24 +5,25 @@
     <p:sldMasterId id="2147483648" r:id="rId1"/>
   </p:sldMasterIdLst>
   <p:notesMasterIdLst>
-    <p:notesMasterId r:id="rId14"/>
+    <p:notesMasterId r:id="rId15"/>
   </p:notesMasterIdLst>
   <p:handoutMasterIdLst>
-    <p:handoutMasterId r:id="rId15"/>
+    <p:handoutMasterId r:id="rId16"/>
   </p:handoutMasterIdLst>
   <p:sldIdLst>
     <p:sldId id="341" r:id="rId2"/>
     <p:sldId id="513" r:id="rId3"/>
     <p:sldId id="514" r:id="rId4"/>
-    <p:sldId id="515" r:id="rId5"/>
-    <p:sldId id="516" r:id="rId6"/>
-    <p:sldId id="517" r:id="rId7"/>
-    <p:sldId id="518" r:id="rId8"/>
-    <p:sldId id="519" r:id="rId9"/>
-    <p:sldId id="520" r:id="rId10"/>
-    <p:sldId id="521" r:id="rId11"/>
-    <p:sldId id="522" r:id="rId12"/>
-    <p:sldId id="512" r:id="rId13"/>
+    <p:sldId id="523" r:id="rId5"/>
+    <p:sldId id="515" r:id="rId6"/>
+    <p:sldId id="516" r:id="rId7"/>
+    <p:sldId id="517" r:id="rId8"/>
+    <p:sldId id="518" r:id="rId9"/>
+    <p:sldId id="519" r:id="rId10"/>
+    <p:sldId id="520" r:id="rId11"/>
+    <p:sldId id="521" r:id="rId12"/>
+    <p:sldId id="522" r:id="rId13"/>
+    <p:sldId id="512" r:id="rId14"/>
   </p:sldIdLst>
   <p:sldSz cx="9144000" cy="6858000" type="screen4x3"/>
   <p:notesSz cx="7315200" cy="9601200"/>
@@ -257,7 +258,7 @@
               <a:pPr>
                 <a:defRPr/>
               </a:pPr>
-              <a:t>11/14/15</a:t>
+              <a:t>11/17/15</a:t>
             </a:fld>
             <a:endParaRPr lang="en-US"/>
           </a:p>
@@ -464,7 +465,7 @@
               <a:pPr>
                 <a:defRPr/>
               </a:pPr>
-              <a:t>11/14/15</a:t>
+              <a:t>11/17/15</a:t>
             </a:fld>
             <a:endParaRPr lang="en-US"/>
           </a:p>
@@ -1214,7 +1215,7 @@
                 <a:latin typeface="Calibri" charset="0"/>
               </a:rPr>
               <a:pPr eaLnBrk="1" hangingPunct="1"/>
-              <a:t>4</a:t>
+              <a:t>5</a:t>
             </a:fld>
             <a:endParaRPr lang="en-US" sz="1300">
               <a:latin typeface="Calibri" charset="0"/>
@@ -1473,7 +1474,7 @@
                 <a:latin typeface="Calibri" charset="0"/>
               </a:rPr>
               <a:pPr eaLnBrk="1" hangingPunct="1"/>
-              <a:t>5</a:t>
+              <a:t>6</a:t>
             </a:fld>
             <a:endParaRPr lang="en-US" sz="1300">
               <a:latin typeface="Calibri" charset="0"/>
@@ -1732,7 +1733,7 @@
                 <a:latin typeface="Calibri" charset="0"/>
               </a:rPr>
               <a:pPr eaLnBrk="1" hangingPunct="1"/>
-              <a:t>6</a:t>
+              <a:t>7</a:t>
             </a:fld>
             <a:endParaRPr lang="en-US" sz="1300">
               <a:latin typeface="Calibri" charset="0"/>
@@ -2073,7 +2074,7 @@
                 <a:latin typeface="Calibri" charset="0"/>
               </a:rPr>
               <a:pPr eaLnBrk="1" hangingPunct="1"/>
-              <a:t>7</a:t>
+              <a:t>8</a:t>
             </a:fld>
             <a:endParaRPr lang="en-US" sz="1300">
               <a:latin typeface="Calibri" charset="0"/>
@@ -2340,7 +2341,7 @@
                 <a:latin typeface="Calibri" charset="0"/>
               </a:rPr>
               <a:pPr eaLnBrk="1" hangingPunct="1"/>
-              <a:t>8</a:t>
+              <a:t>9</a:t>
             </a:fld>
             <a:endParaRPr lang="en-US" sz="1300">
               <a:latin typeface="Calibri" charset="0"/>
@@ -2607,7 +2608,7 @@
                 <a:latin typeface="Calibri" charset="0"/>
               </a:rPr>
               <a:pPr eaLnBrk="1" hangingPunct="1"/>
-              <a:t>9</a:t>
+              <a:t>10</a:t>
             </a:fld>
             <a:endParaRPr lang="en-US" sz="1300">
               <a:latin typeface="Calibri" charset="0"/>
@@ -2874,7 +2875,7 @@
                 <a:latin typeface="Calibri" charset="0"/>
               </a:rPr>
               <a:pPr eaLnBrk="1" hangingPunct="1"/>
-              <a:t>10</a:t>
+              <a:t>11</a:t>
             </a:fld>
             <a:endParaRPr lang="en-US" sz="1300">
               <a:latin typeface="Calibri" charset="0"/>
@@ -5198,7 +5199,7 @@
               <a:pPr>
                 <a:defRPr/>
               </a:pPr>
-              <a:t>11/14/15</a:t>
+              <a:t>11/17/15</a:t>
             </a:fld>
             <a:endParaRPr lang="en-US"/>
           </a:p>
@@ -5954,6 +5955,300 @@
       </p:grpSpPr>
       <p:sp>
         <p:nvSpPr>
+          <p:cNvPr id="29697" name="Title 1"/>
+          <p:cNvSpPr>
+            <a:spLocks noGrp="1"/>
+          </p:cNvSpPr>
+          <p:nvPr>
+            <p:ph type="title"/>
+          </p:nvPr>
+        </p:nvSpPr>
+        <p:spPr>
+          <a:xfrm>
+            <a:off x="152400" y="44450"/>
+            <a:ext cx="8839200" cy="1143000"/>
+          </a:xfrm>
+        </p:spPr>
+        <p:txBody>
+          <a:bodyPr/>
+          <a:lstStyle/>
+          <a:p>
+            <a:r>
+              <a:rPr lang="en-US" sz="3600" dirty="0" smtClean="0">
+                <a:latin typeface="Calibri" charset="0"/>
+                <a:ea typeface="ＭＳ Ｐゴシック" charset="0"/>
+              </a:rPr>
+              <a:t>Summarize </a:t>
+            </a:r>
+            <a:r>
+              <a:rPr lang="en-US" sz="3600" dirty="0">
+                <a:latin typeface="Calibri" charset="0"/>
+                <a:ea typeface="ＭＳ Ｐゴシック" charset="0"/>
+              </a:rPr>
+              <a:t>and visualize results</a:t>
+            </a:r>
+            <a:br>
+              <a:rPr lang="en-US" sz="3600" dirty="0">
+                <a:latin typeface="Calibri" charset="0"/>
+                <a:ea typeface="ＭＳ Ｐゴシック" charset="0"/>
+              </a:rPr>
+            </a:br>
+            <a:r>
+              <a:rPr lang="en-US" sz="3600" dirty="0">
+                <a:latin typeface="Calibri" charset="0"/>
+                <a:ea typeface="ＭＳ Ｐゴシック" charset="0"/>
+              </a:rPr>
+              <a:t>(optional)</a:t>
+            </a:r>
+          </a:p>
+        </p:txBody>
+      </p:sp>
+      <p:sp>
+        <p:nvSpPr>
+          <p:cNvPr id="29698" name="Content Placeholder 2"/>
+          <p:cNvSpPr>
+            <a:spLocks noGrp="1"/>
+          </p:cNvSpPr>
+          <p:nvPr>
+            <p:ph idx="1"/>
+          </p:nvPr>
+        </p:nvSpPr>
+        <p:spPr>
+          <a:xfrm>
+            <a:off x="152400" y="1268413"/>
+            <a:ext cx="8839200" cy="5056187"/>
+          </a:xfrm>
+        </p:spPr>
+        <p:txBody>
+          <a:bodyPr/>
+          <a:lstStyle/>
+          <a:p>
+            <a:pPr>
+              <a:lnSpc>
+                <a:spcPct val="90000"/>
+              </a:lnSpc>
+            </a:pPr>
+            <a:r>
+              <a:rPr lang="en-US" sz="2600" dirty="0">
+                <a:latin typeface="Calibri" charset="0"/>
+                <a:ea typeface="ＭＳ Ｐゴシック" charset="0"/>
+              </a:rPr>
+              <a:t>In this step we will use R to summarize and visualize the results of the previous steps</a:t>
+            </a:r>
+          </a:p>
+          <a:p>
+            <a:pPr marL="342900" lvl="1" indent="-342900">
+              <a:lnSpc>
+                <a:spcPct val="90000"/>
+              </a:lnSpc>
+              <a:buFont typeface="Arial" charset="0"/>
+              <a:buChar char="•"/>
+            </a:pPr>
+            <a:r>
+              <a:rPr lang="en-US" sz="2600" dirty="0">
+                <a:latin typeface="Calibri" charset="0"/>
+                <a:ea typeface="ＭＳ Ｐゴシック" charset="0"/>
+              </a:rPr>
+              <a:t>Explanation of the R commands is provided in </a:t>
+            </a:r>
+            <a:r>
+              <a:rPr lang="en-US" sz="2600" dirty="0" smtClean="0">
+                <a:latin typeface="Calibri" charset="0"/>
+                <a:ea typeface="ＭＳ Ｐゴシック" charset="0"/>
+              </a:rPr>
+              <a:t>the online wiki</a:t>
+            </a:r>
+            <a:endParaRPr lang="en-US" altLang="ja-JP" sz="2600" dirty="0">
+              <a:latin typeface="Calibri" charset="0"/>
+              <a:ea typeface="ＭＳ Ｐゴシック" charset="0"/>
+            </a:endParaRPr>
+          </a:p>
+          <a:p>
+            <a:pPr>
+              <a:lnSpc>
+                <a:spcPct val="90000"/>
+              </a:lnSpc>
+            </a:pPr>
+            <a:r>
+              <a:rPr lang="en-US" sz="2600" dirty="0">
+                <a:latin typeface="Calibri" charset="0"/>
+                <a:ea typeface="ＭＳ Ｐゴシック" charset="0"/>
+              </a:rPr>
+              <a:t>Examples of the tasks performed:</a:t>
+            </a:r>
+          </a:p>
+          <a:p>
+            <a:pPr marL="342900" lvl="1" indent="-342900">
+              <a:lnSpc>
+                <a:spcPct val="90000"/>
+              </a:lnSpc>
+            </a:pPr>
+            <a:r>
+              <a:rPr lang="en-US" sz="2200" dirty="0">
+                <a:latin typeface="Calibri" charset="0"/>
+                <a:ea typeface="ＭＳ Ｐゴシック" charset="0"/>
+              </a:rPr>
+              <a:t>Examine the expression estimates</a:t>
+            </a:r>
+          </a:p>
+          <a:p>
+            <a:pPr lvl="2">
+              <a:lnSpc>
+                <a:spcPct val="90000"/>
+              </a:lnSpc>
+            </a:pPr>
+            <a:r>
+              <a:rPr lang="en-US" sz="1900" dirty="0">
+                <a:latin typeface="Calibri" charset="0"/>
+                <a:ea typeface="ＭＳ Ｐゴシック" charset="0"/>
+              </a:rPr>
+              <a:t>How reproducible are the technical replicates?  </a:t>
+            </a:r>
+          </a:p>
+          <a:p>
+            <a:pPr lvl="2">
+              <a:lnSpc>
+                <a:spcPct val="90000"/>
+              </a:lnSpc>
+            </a:pPr>
+            <a:r>
+              <a:rPr lang="en-US" sz="1900" dirty="0">
+                <a:latin typeface="Calibri" charset="0"/>
+                <a:ea typeface="ＭＳ Ｐゴシック" charset="0"/>
+              </a:rPr>
+              <a:t>How well do the different library construction methods correlate? </a:t>
+            </a:r>
+          </a:p>
+          <a:p>
+            <a:pPr lvl="2">
+              <a:lnSpc>
+                <a:spcPct val="90000"/>
+              </a:lnSpc>
+            </a:pPr>
+            <a:r>
+              <a:rPr lang="en-US" sz="1900" dirty="0">
+                <a:latin typeface="Calibri" charset="0"/>
+                <a:ea typeface="ＭＳ Ｐゴシック" charset="0"/>
+              </a:rPr>
+              <a:t>Visualize the differences between/among replicates, library prep methods and tumor versus normal</a:t>
+            </a:r>
+          </a:p>
+          <a:p>
+            <a:pPr marL="342900" lvl="1" indent="-342900">
+              <a:lnSpc>
+                <a:spcPct val="90000"/>
+              </a:lnSpc>
+            </a:pPr>
+            <a:r>
+              <a:rPr lang="en-US" sz="2200" dirty="0">
+                <a:latin typeface="Calibri" charset="0"/>
+                <a:ea typeface="ＭＳ Ｐゴシック" charset="0"/>
+              </a:rPr>
+              <a:t>Examine the differential expression estimates</a:t>
+            </a:r>
+          </a:p>
+          <a:p>
+            <a:pPr lvl="2">
+              <a:lnSpc>
+                <a:spcPct val="90000"/>
+              </a:lnSpc>
+            </a:pPr>
+            <a:r>
+              <a:rPr lang="en-US" sz="1900" dirty="0">
+                <a:latin typeface="Calibri" charset="0"/>
+                <a:ea typeface="ＭＳ Ｐゴシック" charset="0"/>
+              </a:rPr>
+              <a:t>Visualize the expression estimates and highlight those genes that appear to be differentially expressed according to </a:t>
+            </a:r>
+            <a:r>
+              <a:rPr lang="en-US" sz="1900" dirty="0" err="1">
+                <a:latin typeface="Calibri" charset="0"/>
+                <a:ea typeface="ＭＳ Ｐゴシック" charset="0"/>
+              </a:rPr>
+              <a:t>cuffdiff</a:t>
+            </a:r>
+            <a:endParaRPr lang="en-US" sz="1900" dirty="0">
+              <a:latin typeface="Calibri" charset="0"/>
+              <a:ea typeface="ＭＳ Ｐゴシック" charset="0"/>
+            </a:endParaRPr>
+          </a:p>
+          <a:p>
+            <a:pPr lvl="2">
+              <a:lnSpc>
+                <a:spcPct val="90000"/>
+              </a:lnSpc>
+            </a:pPr>
+            <a:r>
+              <a:rPr lang="en-US" sz="1900" dirty="0">
+                <a:latin typeface="Calibri" charset="0"/>
+                <a:ea typeface="ＭＳ Ｐゴシック" charset="0"/>
+              </a:rPr>
+              <a:t>Generate a list of the top differentially expressed genes</a:t>
+            </a:r>
+          </a:p>
+          <a:p>
+            <a:pPr>
+              <a:lnSpc>
+                <a:spcPct val="90000"/>
+              </a:lnSpc>
+            </a:pPr>
+            <a:endParaRPr lang="en-US" sz="2600" dirty="0">
+              <a:latin typeface="Calibri" charset="0"/>
+              <a:ea typeface="ＭＳ Ｐゴシック" charset="0"/>
+            </a:endParaRPr>
+          </a:p>
+          <a:p>
+            <a:pPr>
+              <a:lnSpc>
+                <a:spcPct val="90000"/>
+              </a:lnSpc>
+            </a:pPr>
+            <a:endParaRPr lang="en-US" sz="2600" dirty="0">
+              <a:latin typeface="Calibri" charset="0"/>
+              <a:ea typeface="ＭＳ Ｐゴシック" charset="0"/>
+            </a:endParaRPr>
+          </a:p>
+        </p:txBody>
+      </p:sp>
+    </p:spTree>
+    <p:extLst>
+      <p:ext uri="{BB962C8B-B14F-4D97-AF65-F5344CB8AC3E}">
+        <p14:creationId xmlns:p14="http://schemas.microsoft.com/office/powerpoint/2010/main" val="3131372927"/>
+      </p:ext>
+    </p:extLst>
+  </p:cSld>
+  <p:clrMapOvr>
+    <a:masterClrMapping/>
+  </p:clrMapOvr>
+  <p:timing>
+    <p:tnLst>
+      <p:par>
+        <p:cTn xmlns:p14="http://schemas.microsoft.com/office/powerpoint/2010/main" id="1" dur="indefinite" restart="never" nodeType="tmRoot"/>
+      </p:par>
+    </p:tnLst>
+  </p:timing>
+</p:sld>
+</file>
+
+<file path=ppt/slides/slide11.xml><?xml version="1.0" encoding="utf-8"?>
+<p:sld xmlns:a="http://schemas.openxmlformats.org/drawingml/2006/main" xmlns:r="http://schemas.openxmlformats.org/officeDocument/2006/relationships" xmlns:p="http://schemas.openxmlformats.org/presentationml/2006/main">
+  <p:cSld>
+    <p:spTree>
+      <p:nvGrpSpPr>
+        <p:cNvPr id="1" name=""/>
+        <p:cNvGrpSpPr/>
+        <p:nvPr/>
+      </p:nvGrpSpPr>
+      <p:grpSpPr>
+        <a:xfrm>
+          <a:off x="0" y="0"/>
+          <a:ext cx="0" cy="0"/>
+          <a:chOff x="0" y="0"/>
+          <a:chExt cx="0" cy="0"/>
+        </a:xfrm>
+      </p:grpSpPr>
+      <p:sp>
+        <p:nvSpPr>
           <p:cNvPr id="31745" name="Title 1"/>
           <p:cNvSpPr>
             <a:spLocks noGrp="1"/>
@@ -6134,7 +6429,7 @@
 </p:sld>
 </file>
 
-<file path=ppt/slides/slide11.xml><?xml version="1.0" encoding="utf-8"?>
+<file path=ppt/slides/slide12.xml><?xml version="1.0" encoding="utf-8"?>
 <p:sld xmlns:a="http://schemas.openxmlformats.org/drawingml/2006/main" xmlns:r="http://schemas.openxmlformats.org/officeDocument/2006/relationships" xmlns:p="http://schemas.openxmlformats.org/presentationml/2006/main">
   <p:cSld>
     <p:spTree>
@@ -6560,7 +6855,7 @@
 </p:sld>
 </file>
 
-<file path=ppt/slides/slide12.xml><?xml version="1.0" encoding="utf-8"?>
+<file path=ppt/slides/slide13.xml><?xml version="1.0" encoding="utf-8"?>
 <p:sld xmlns:a="http://schemas.openxmlformats.org/drawingml/2006/main" xmlns:r="http://schemas.openxmlformats.org/officeDocument/2006/relationships" xmlns:p="http://schemas.openxmlformats.org/presentationml/2006/main">
   <p:cSld>
     <p:spTree>
@@ -7001,16 +7296,6 @@
               </a:rPr>
               <a:t>3</a:t>
             </a:r>
-            <a:r>
-              <a:rPr lang="en-US" sz="2000" dirty="0">
-                <a:solidFill>
-                  <a:schemeClr val="bg1"/>
-                </a:solidFill>
-                <a:latin typeface="Calibri" charset="0"/>
-                <a:cs typeface="Segoe UI" charset="0"/>
-              </a:rPr>
-              <a:t/>
-            </a:r>
             <a:br>
               <a:rPr lang="en-US" sz="2000" dirty="0">
                 <a:solidFill>
@@ -7028,37 +7313,7 @@
                 <a:latin typeface="Calibri" charset="0"/>
                 <a:cs typeface="Segoe UI" charset="0"/>
               </a:rPr>
-              <a:t>Expression and Differential Expression</a:t>
-            </a:r>
-            <a:r>
-              <a:rPr lang="en-US" sz="2000" dirty="0" smtClean="0">
-                <a:solidFill>
-                  <a:schemeClr val="bg1"/>
-                </a:solidFill>
-                <a:latin typeface="Calibri" charset="0"/>
-                <a:cs typeface="Segoe UI" charset="0"/>
-              </a:rPr>
-              <a:t> (</a:t>
-            </a:r>
-            <a:r>
-              <a:rPr lang="en-US" sz="2000" dirty="0" smtClean="0">
-                <a:solidFill>
-                  <a:schemeClr val="bg1"/>
-                </a:solidFill>
-                <a:latin typeface="Calibri" charset="0"/>
-                <a:cs typeface="Segoe UI" charset="0"/>
-              </a:rPr>
-              <a:t>tutorial</a:t>
-            </a:r>
-            <a:r>
-              <a:rPr lang="en-US" sz="2000" dirty="0" smtClean="0">
-                <a:solidFill>
-                  <a:schemeClr val="bg1"/>
-                </a:solidFill>
-                <a:latin typeface="Calibri" charset="0"/>
-                <a:cs typeface="Segoe UI" charset="0"/>
-              </a:rPr>
-              <a:t>)</a:t>
+              <a:t>Expression and Differential Expression (tutorial)</a:t>
             </a:r>
             <a:endParaRPr lang="en-US" sz="1800" b="1" dirty="0">
               <a:solidFill>
@@ -7352,6 +7607,102 @@
       </p:grpSpPr>
       <p:sp>
         <p:nvSpPr>
+          <p:cNvPr id="2" name="Title 1"/>
+          <p:cNvSpPr>
+            <a:spLocks noGrp="1"/>
+          </p:cNvSpPr>
+          <p:nvPr>
+            <p:ph type="title"/>
+          </p:nvPr>
+        </p:nvSpPr>
+        <p:spPr>
+          <a:xfrm>
+            <a:off x="152400" y="274638"/>
+            <a:ext cx="8839200" cy="706090"/>
+          </a:xfrm>
+        </p:spPr>
+        <p:txBody>
+          <a:bodyPr/>
+          <a:lstStyle/>
+          <a:p>
+            <a:r>
+              <a:rPr lang="en-US" dirty="0" smtClean="0"/>
+              <a:t>RNA-</a:t>
+            </a:r>
+            <a:r>
+              <a:rPr lang="en-US" dirty="0" err="1" smtClean="0"/>
+              <a:t>seq</a:t>
+            </a:r>
+            <a:r>
+              <a:rPr lang="en-US" dirty="0" smtClean="0"/>
+              <a:t> Analysis Flow Chart</a:t>
+            </a:r>
+            <a:endParaRPr lang="en-US" dirty="0"/>
+          </a:p>
+        </p:txBody>
+      </p:sp>
+      <p:pic>
+        <p:nvPicPr>
+          <p:cNvPr id="4" name="Content Placeholder 3" descr="journal.pcbi.1004393.g005.PNG"/>
+          <p:cNvPicPr>
+            <a:picLocks noGrp="1" noChangeAspect="1"/>
+          </p:cNvPicPr>
+          <p:nvPr>
+            <p:ph idx="1"/>
+          </p:nvPr>
+        </p:nvPicPr>
+        <p:blipFill>
+          <a:blip r:embed="rId2" cstate="print">
+            <a:extLst>
+              <a:ext uri="{28A0092B-C50C-407E-A947-70E740481C1C}">
+                <a14:useLocalDpi xmlns:a14="http://schemas.microsoft.com/office/drawing/2010/main" val="0"/>
+              </a:ext>
+            </a:extLst>
+          </a:blip>
+          <a:srcRect l="-91517" r="-91517"/>
+          <a:stretch>
+            <a:fillRect/>
+          </a:stretch>
+        </p:blipFill>
+        <p:spPr>
+          <a:xfrm>
+            <a:off x="-385652" y="980728"/>
+            <a:ext cx="9998212" cy="5343872"/>
+          </a:xfrm>
+        </p:spPr>
+      </p:pic>
+    </p:spTree>
+    <p:extLst>
+      <p:ext uri="{BB962C8B-B14F-4D97-AF65-F5344CB8AC3E}">
+        <p14:creationId xmlns:p14="http://schemas.microsoft.com/office/powerpoint/2010/main" val="793149458"/>
+      </p:ext>
+    </p:extLst>
+  </p:cSld>
+  <p:clrMapOvr>
+    <a:masterClrMapping/>
+  </p:clrMapOvr>
+</p:sld>
+</file>
+
+<file path=ppt/slides/slide5.xml><?xml version="1.0" encoding="utf-8"?>
+<p:sld xmlns:a="http://schemas.openxmlformats.org/drawingml/2006/main" xmlns:r="http://schemas.openxmlformats.org/officeDocument/2006/relationships" xmlns:p="http://schemas.openxmlformats.org/presentationml/2006/main">
+  <p:cSld>
+    <p:spTree>
+      <p:nvGrpSpPr>
+        <p:cNvPr id="1" name=""/>
+        <p:cNvGrpSpPr/>
+        <p:nvPr/>
+      </p:nvGrpSpPr>
+      <p:grpSpPr>
+        <a:xfrm>
+          <a:off x="0" y="0"/>
+          <a:ext cx="0" cy="0"/>
+          <a:chOff x="0" y="0"/>
+          <a:chExt cx="0" cy="0"/>
+        </a:xfrm>
+      </p:grpSpPr>
+      <p:sp>
+        <p:nvSpPr>
           <p:cNvPr id="19457" name="Rectangle 2"/>
           <p:cNvSpPr>
             <a:spLocks noGrp="1" noChangeArrowheads="1"/>
@@ -7761,7 +8112,7 @@
 </p:sld>
 </file>
 
-<file path=ppt/slides/slide5.xml><?xml version="1.0" encoding="utf-8"?>
+<file path=ppt/slides/slide6.xml><?xml version="1.0" encoding="utf-8"?>
 <p:sld xmlns:a="http://schemas.openxmlformats.org/drawingml/2006/main" xmlns:r="http://schemas.openxmlformats.org/officeDocument/2006/relationships" xmlns:p="http://schemas.openxmlformats.org/presentationml/2006/main">
   <p:cSld>
     <p:spTree>
@@ -8062,7 +8413,7 @@
 </p:sld>
 </file>
 
-<file path=ppt/slides/slide6.xml><?xml version="1.0" encoding="utf-8"?>
+<file path=ppt/slides/slide7.xml><?xml version="1.0" encoding="utf-8"?>
 <p:sld xmlns:a="http://schemas.openxmlformats.org/drawingml/2006/main" xmlns:r="http://schemas.openxmlformats.org/officeDocument/2006/relationships" xmlns:p="http://schemas.openxmlformats.org/presentationml/2006/main">
   <p:cSld>
     <p:spTree>
@@ -8370,7 +8721,7 @@
 </p:sld>
 </file>
 
-<file path=ppt/slides/slide7.xml><?xml version="1.0" encoding="utf-8"?>
+<file path=ppt/slides/slide8.xml><?xml version="1.0" encoding="utf-8"?>
 <p:sld xmlns:a="http://schemas.openxmlformats.org/drawingml/2006/main" xmlns:r="http://schemas.openxmlformats.org/officeDocument/2006/relationships" xmlns:p="http://schemas.openxmlformats.org/presentationml/2006/main">
   <p:cSld>
     <p:spTree>
@@ -8765,7 +9116,7 @@
 </p:sld>
 </file>
 
-<file path=ppt/slides/slide8.xml><?xml version="1.0" encoding="utf-8"?>
+<file path=ppt/slides/slide9.xml><?xml version="1.0" encoding="utf-8"?>
 <p:sld xmlns:a="http://schemas.openxmlformats.org/drawingml/2006/main" xmlns:r="http://schemas.openxmlformats.org/officeDocument/2006/relationships" xmlns:p="http://schemas.openxmlformats.org/presentationml/2006/main">
   <p:cSld>
     <p:spTree>
@@ -8932,300 +9283,6 @@
     <p:extLst>
       <p:ext uri="{BB962C8B-B14F-4D97-AF65-F5344CB8AC3E}">
         <p14:creationId xmlns:p14="http://schemas.microsoft.com/office/powerpoint/2010/main" val="616290861"/>
-      </p:ext>
-    </p:extLst>
-  </p:cSld>
-  <p:clrMapOvr>
-    <a:masterClrMapping/>
-  </p:clrMapOvr>
-  <p:timing>
-    <p:tnLst>
-      <p:par>
-        <p:cTn xmlns:p14="http://schemas.microsoft.com/office/powerpoint/2010/main" id="1" dur="indefinite" restart="never" nodeType="tmRoot"/>
-      </p:par>
-    </p:tnLst>
-  </p:timing>
-</p:sld>
-</file>
-
-<file path=ppt/slides/slide9.xml><?xml version="1.0" encoding="utf-8"?>
-<p:sld xmlns:a="http://schemas.openxmlformats.org/drawingml/2006/main" xmlns:r="http://schemas.openxmlformats.org/officeDocument/2006/relationships" xmlns:p="http://schemas.openxmlformats.org/presentationml/2006/main">
-  <p:cSld>
-    <p:spTree>
-      <p:nvGrpSpPr>
-        <p:cNvPr id="1" name=""/>
-        <p:cNvGrpSpPr/>
-        <p:nvPr/>
-      </p:nvGrpSpPr>
-      <p:grpSpPr>
-        <a:xfrm>
-          <a:off x="0" y="0"/>
-          <a:ext cx="0" cy="0"/>
-          <a:chOff x="0" y="0"/>
-          <a:chExt cx="0" cy="0"/>
-        </a:xfrm>
-      </p:grpSpPr>
-      <p:sp>
-        <p:nvSpPr>
-          <p:cNvPr id="29697" name="Title 1"/>
-          <p:cNvSpPr>
-            <a:spLocks noGrp="1"/>
-          </p:cNvSpPr>
-          <p:nvPr>
-            <p:ph type="title"/>
-          </p:nvPr>
-        </p:nvSpPr>
-        <p:spPr>
-          <a:xfrm>
-            <a:off x="152400" y="44450"/>
-            <a:ext cx="8839200" cy="1143000"/>
-          </a:xfrm>
-        </p:spPr>
-        <p:txBody>
-          <a:bodyPr/>
-          <a:lstStyle/>
-          <a:p>
-            <a:r>
-              <a:rPr lang="en-US" sz="3600" dirty="0" smtClean="0">
-                <a:latin typeface="Calibri" charset="0"/>
-                <a:ea typeface="ＭＳ Ｐゴシック" charset="0"/>
-              </a:rPr>
-              <a:t>Summarize </a:t>
-            </a:r>
-            <a:r>
-              <a:rPr lang="en-US" sz="3600" dirty="0">
-                <a:latin typeface="Calibri" charset="0"/>
-                <a:ea typeface="ＭＳ Ｐゴシック" charset="0"/>
-              </a:rPr>
-              <a:t>and visualize results</a:t>
-            </a:r>
-            <a:br>
-              <a:rPr lang="en-US" sz="3600" dirty="0">
-                <a:latin typeface="Calibri" charset="0"/>
-                <a:ea typeface="ＭＳ Ｐゴシック" charset="0"/>
-              </a:rPr>
-            </a:br>
-            <a:r>
-              <a:rPr lang="en-US" sz="3600" dirty="0">
-                <a:latin typeface="Calibri" charset="0"/>
-                <a:ea typeface="ＭＳ Ｐゴシック" charset="0"/>
-              </a:rPr>
-              <a:t>(optional)</a:t>
-            </a:r>
-          </a:p>
-        </p:txBody>
-      </p:sp>
-      <p:sp>
-        <p:nvSpPr>
-          <p:cNvPr id="29698" name="Content Placeholder 2"/>
-          <p:cNvSpPr>
-            <a:spLocks noGrp="1"/>
-          </p:cNvSpPr>
-          <p:nvPr>
-            <p:ph idx="1"/>
-          </p:nvPr>
-        </p:nvSpPr>
-        <p:spPr>
-          <a:xfrm>
-            <a:off x="152400" y="1268413"/>
-            <a:ext cx="8839200" cy="5056187"/>
-          </a:xfrm>
-        </p:spPr>
-        <p:txBody>
-          <a:bodyPr/>
-          <a:lstStyle/>
-          <a:p>
-            <a:pPr>
-              <a:lnSpc>
-                <a:spcPct val="90000"/>
-              </a:lnSpc>
-            </a:pPr>
-            <a:r>
-              <a:rPr lang="en-US" sz="2600" dirty="0">
-                <a:latin typeface="Calibri" charset="0"/>
-                <a:ea typeface="ＭＳ Ｐゴシック" charset="0"/>
-              </a:rPr>
-              <a:t>In this step we will use R to summarize and visualize the results of the previous steps</a:t>
-            </a:r>
-          </a:p>
-          <a:p>
-            <a:pPr marL="342900" lvl="1" indent="-342900">
-              <a:lnSpc>
-                <a:spcPct val="90000"/>
-              </a:lnSpc>
-              <a:buFont typeface="Arial" charset="0"/>
-              <a:buChar char="•"/>
-            </a:pPr>
-            <a:r>
-              <a:rPr lang="en-US" sz="2600" dirty="0">
-                <a:latin typeface="Calibri" charset="0"/>
-                <a:ea typeface="ＭＳ Ｐゴシック" charset="0"/>
-              </a:rPr>
-              <a:t>Explanation of the R commands is provided in </a:t>
-            </a:r>
-            <a:r>
-              <a:rPr lang="en-US" sz="2600" dirty="0" smtClean="0">
-                <a:latin typeface="Calibri" charset="0"/>
-                <a:ea typeface="ＭＳ Ｐゴシック" charset="0"/>
-              </a:rPr>
-              <a:t>the online wiki</a:t>
-            </a:r>
-            <a:endParaRPr lang="en-US" altLang="ja-JP" sz="2600" dirty="0">
-              <a:latin typeface="Calibri" charset="0"/>
-              <a:ea typeface="ＭＳ Ｐゴシック" charset="0"/>
-            </a:endParaRPr>
-          </a:p>
-          <a:p>
-            <a:pPr>
-              <a:lnSpc>
-                <a:spcPct val="90000"/>
-              </a:lnSpc>
-            </a:pPr>
-            <a:r>
-              <a:rPr lang="en-US" sz="2600" dirty="0">
-                <a:latin typeface="Calibri" charset="0"/>
-                <a:ea typeface="ＭＳ Ｐゴシック" charset="0"/>
-              </a:rPr>
-              <a:t>Examples of the tasks performed:</a:t>
-            </a:r>
-          </a:p>
-          <a:p>
-            <a:pPr marL="342900" lvl="1" indent="-342900">
-              <a:lnSpc>
-                <a:spcPct val="90000"/>
-              </a:lnSpc>
-            </a:pPr>
-            <a:r>
-              <a:rPr lang="en-US" sz="2200" dirty="0">
-                <a:latin typeface="Calibri" charset="0"/>
-                <a:ea typeface="ＭＳ Ｐゴシック" charset="0"/>
-              </a:rPr>
-              <a:t>Examine the expression estimates</a:t>
-            </a:r>
-          </a:p>
-          <a:p>
-            <a:pPr lvl="2">
-              <a:lnSpc>
-                <a:spcPct val="90000"/>
-              </a:lnSpc>
-            </a:pPr>
-            <a:r>
-              <a:rPr lang="en-US" sz="1900" dirty="0">
-                <a:latin typeface="Calibri" charset="0"/>
-                <a:ea typeface="ＭＳ Ｐゴシック" charset="0"/>
-              </a:rPr>
-              <a:t>How reproducible are the technical replicates?  </a:t>
-            </a:r>
-          </a:p>
-          <a:p>
-            <a:pPr lvl="2">
-              <a:lnSpc>
-                <a:spcPct val="90000"/>
-              </a:lnSpc>
-            </a:pPr>
-            <a:r>
-              <a:rPr lang="en-US" sz="1900" dirty="0">
-                <a:latin typeface="Calibri" charset="0"/>
-                <a:ea typeface="ＭＳ Ｐゴシック" charset="0"/>
-              </a:rPr>
-              <a:t>How well do the different library construction methods correlate? </a:t>
-            </a:r>
-          </a:p>
-          <a:p>
-            <a:pPr lvl="2">
-              <a:lnSpc>
-                <a:spcPct val="90000"/>
-              </a:lnSpc>
-            </a:pPr>
-            <a:r>
-              <a:rPr lang="en-US" sz="1900" dirty="0">
-                <a:latin typeface="Calibri" charset="0"/>
-                <a:ea typeface="ＭＳ Ｐゴシック" charset="0"/>
-              </a:rPr>
-              <a:t>Visualize the differences between/among replicates, library prep methods and tumor versus normal</a:t>
-            </a:r>
-          </a:p>
-          <a:p>
-            <a:pPr marL="342900" lvl="1" indent="-342900">
-              <a:lnSpc>
-                <a:spcPct val="90000"/>
-              </a:lnSpc>
-            </a:pPr>
-            <a:r>
-              <a:rPr lang="en-US" sz="2200" dirty="0">
-                <a:latin typeface="Calibri" charset="0"/>
-                <a:ea typeface="ＭＳ Ｐゴシック" charset="0"/>
-              </a:rPr>
-              <a:t>Examine the differential expression estimates</a:t>
-            </a:r>
-          </a:p>
-          <a:p>
-            <a:pPr lvl="2">
-              <a:lnSpc>
-                <a:spcPct val="90000"/>
-              </a:lnSpc>
-            </a:pPr>
-            <a:r>
-              <a:rPr lang="en-US" sz="1900" dirty="0">
-                <a:latin typeface="Calibri" charset="0"/>
-                <a:ea typeface="ＭＳ Ｐゴシック" charset="0"/>
-              </a:rPr>
-              <a:t>Visualize the expression estimates and highlight those genes that appear to be differentially expressed according to </a:t>
-            </a:r>
-            <a:r>
-              <a:rPr lang="en-US" sz="1900" dirty="0" err="1">
-                <a:latin typeface="Calibri" charset="0"/>
-                <a:ea typeface="ＭＳ Ｐゴシック" charset="0"/>
-              </a:rPr>
-              <a:t>cuffdiff</a:t>
-            </a:r>
-            <a:endParaRPr lang="en-US" sz="1900" dirty="0">
-              <a:latin typeface="Calibri" charset="0"/>
-              <a:ea typeface="ＭＳ Ｐゴシック" charset="0"/>
-            </a:endParaRPr>
-          </a:p>
-          <a:p>
-            <a:pPr lvl="2">
-              <a:lnSpc>
-                <a:spcPct val="90000"/>
-              </a:lnSpc>
-            </a:pPr>
-            <a:r>
-              <a:rPr lang="en-US" sz="1900" dirty="0">
-                <a:latin typeface="Calibri" charset="0"/>
-                <a:ea typeface="ＭＳ Ｐゴシック" charset="0"/>
-              </a:rPr>
-              <a:t>Generate a list of the top differentially expressed genes</a:t>
-            </a:r>
-          </a:p>
-          <a:p>
-            <a:pPr>
-              <a:lnSpc>
-                <a:spcPct val="90000"/>
-              </a:lnSpc>
-            </a:pPr>
-            <a:endParaRPr lang="en-US" sz="2600" dirty="0">
-              <a:latin typeface="Calibri" charset="0"/>
-              <a:ea typeface="ＭＳ Ｐゴシック" charset="0"/>
-            </a:endParaRPr>
-          </a:p>
-          <a:p>
-            <a:pPr>
-              <a:lnSpc>
-                <a:spcPct val="90000"/>
-              </a:lnSpc>
-            </a:pPr>
-            <a:endParaRPr lang="en-US" sz="2600" dirty="0">
-              <a:latin typeface="Calibri" charset="0"/>
-              <a:ea typeface="ＭＳ Ｐゴシック" charset="0"/>
-            </a:endParaRPr>
-          </a:p>
-        </p:txBody>
-      </p:sp>
-    </p:spTree>
-    <p:extLst>
-      <p:ext uri="{BB962C8B-B14F-4D97-AF65-F5344CB8AC3E}">
-        <p14:creationId xmlns:p14="http://schemas.microsoft.com/office/powerpoint/2010/main" val="3131372927"/>
       </p:ext>
     </p:extLst>
   </p:cSld>

</xml_diff>

<commit_message>
clarify which G to use in cufflinks.
</commit_message>
<xml_diff>
--- a/LectureFiles/cshl/2015/RNASeq_Module3_Tutorial.pptx
+++ b/LectureFiles/cshl/2015/RNASeq_Module3_Tutorial.pptx
@@ -7767,7 +7767,7 @@
               </a:lnSpc>
             </a:pPr>
             <a:r>
-              <a:rPr lang="en-US" sz="2400">
+              <a:rPr lang="en-US" sz="2400" dirty="0">
                 <a:latin typeface="Calibri" charset="0"/>
                 <a:ea typeface="ＭＳ Ｐゴシック" charset="0"/>
               </a:rPr>
@@ -7781,7 +7781,7 @@
               </a:lnSpc>
             </a:pPr>
             <a:r>
-              <a:rPr lang="en-US" sz="2000">
+              <a:rPr lang="en-US" sz="2000" dirty="0">
                 <a:latin typeface="Calibri" charset="0"/>
                 <a:ea typeface="ＭＳ Ｐゴシック" charset="0"/>
               </a:rPr>
@@ -7795,35 +7795,35 @@
               </a:lnSpc>
             </a:pPr>
             <a:r>
-              <a:rPr lang="en-US" sz="2400">
+              <a:rPr lang="en-US" sz="2400" dirty="0">
                 <a:latin typeface="Calibri" charset="0"/>
                 <a:ea typeface="ＭＳ Ｐゴシック" charset="0"/>
               </a:rPr>
               <a:t>For this step an option, confusingly also called </a:t>
             </a:r>
             <a:r>
-              <a:rPr lang="ja-JP" altLang="en-US" sz="2400">
+              <a:rPr lang="ja-JP" altLang="en-US" sz="2400" dirty="0">
                 <a:latin typeface="Calibri" charset="0"/>
                 <a:ea typeface="ＭＳ Ｐゴシック" charset="0"/>
               </a:rPr>
               <a:t>‘</a:t>
             </a:r>
             <a:r>
-              <a:rPr lang="en-US" altLang="ja-JP" sz="2400">
+              <a:rPr lang="en-US" altLang="ja-JP" sz="2400" dirty="0">
                 <a:latin typeface="Calibri" charset="0"/>
                 <a:ea typeface="ＭＳ Ｐゴシック" charset="0"/>
               </a:rPr>
               <a:t>-G</a:t>
             </a:r>
             <a:r>
-              <a:rPr lang="ja-JP" altLang="en-US" sz="2400">
+              <a:rPr lang="ja-JP" altLang="en-US" sz="2400" dirty="0">
                 <a:latin typeface="Calibri" charset="0"/>
                 <a:ea typeface="ＭＳ Ｐゴシック" charset="0"/>
               </a:rPr>
               <a:t>’</a:t>
             </a:r>
             <a:r>
-              <a:rPr lang="en-US" altLang="ja-JP" sz="2400">
+              <a:rPr lang="en-US" altLang="ja-JP" sz="2400" dirty="0">
                 <a:latin typeface="Calibri" charset="0"/>
                 <a:ea typeface="ＭＳ Ｐゴシック" charset="0"/>
               </a:rPr>
@@ -7837,7 +7837,7 @@
               </a:lnSpc>
             </a:pPr>
             <a:r>
-              <a:rPr lang="en-US" sz="2000">
+              <a:rPr lang="en-US" sz="2000" dirty="0">
                 <a:latin typeface="Calibri" charset="0"/>
                 <a:ea typeface="ＭＳ Ｐゴシック" charset="0"/>
               </a:rPr>
@@ -7851,7 +7851,7 @@
               </a:lnSpc>
             </a:pPr>
             <a:r>
-              <a:rPr lang="en-US" sz="2000">
+              <a:rPr lang="en-US" sz="2000" dirty="0">
                 <a:latin typeface="Calibri" charset="0"/>
                 <a:ea typeface="ＭＳ Ｐゴシック" charset="0"/>
               </a:rPr>
@@ -7865,7 +7865,7 @@
               </a:lnSpc>
             </a:pPr>
             <a:r>
-              <a:rPr lang="en-US" sz="1700" b="1">
+              <a:rPr lang="en-US" sz="1700" b="1" dirty="0">
                 <a:latin typeface="Calibri" charset="0"/>
                 <a:ea typeface="ＭＳ Ｐゴシック" charset="0"/>
               </a:rPr>
@@ -7879,40 +7879,72 @@
               </a:lnSpc>
             </a:pPr>
             <a:r>
-              <a:rPr lang="en-US" sz="1700">
-                <a:latin typeface="Calibri" charset="0"/>
-                <a:ea typeface="ＭＳ Ｐゴシック" charset="0"/>
-              </a:rPr>
-              <a:t>Use the '-G' option along with the '-g' option.  Known transcripts will be used as a </a:t>
-            </a:r>
-            <a:r>
-              <a:rPr lang="ja-JP" altLang="en-US" sz="1700">
+              <a:rPr lang="en-US" sz="1700" dirty="0">
+                <a:latin typeface="Calibri" charset="0"/>
+                <a:ea typeface="ＭＳ Ｐゴシック" charset="0"/>
+              </a:rPr>
+              <a:t>Use </a:t>
+            </a:r>
+            <a:r>
+              <a:rPr lang="en-US" sz="1700" dirty="0" smtClean="0">
+                <a:latin typeface="Calibri" charset="0"/>
+                <a:ea typeface="ＭＳ Ｐゴシック" charset="0"/>
+              </a:rPr>
+              <a:t>the </a:t>
+            </a:r>
+            <a:r>
+              <a:rPr lang="en-US" sz="1700" dirty="0">
+                <a:latin typeface="Calibri" charset="0"/>
+                <a:ea typeface="ＭＳ Ｐゴシック" charset="0"/>
+              </a:rPr>
+              <a:t>'-g' option.  Known transcripts will be used as a </a:t>
+            </a:r>
+            <a:r>
+              <a:rPr lang="ja-JP" altLang="en-US" sz="1700" dirty="0">
                 <a:latin typeface="Calibri" charset="0"/>
                 <a:ea typeface="ＭＳ Ｐゴシック" charset="0"/>
               </a:rPr>
               <a:t>‘</a:t>
             </a:r>
             <a:r>
+              <a:rPr lang="en-US" altLang="ja-JP" sz="1700" dirty="0">
+                <a:latin typeface="Calibri" charset="0"/>
+                <a:ea typeface="ＭＳ Ｐゴシック" charset="0"/>
+              </a:rPr>
+              <a:t>guide</a:t>
+            </a:r>
+            <a:r>
+              <a:rPr lang="ja-JP" altLang="en-US" sz="1700" dirty="0">
+                <a:latin typeface="Calibri" charset="0"/>
+                <a:ea typeface="ＭＳ Ｐゴシック" charset="0"/>
+              </a:rPr>
+              <a:t>’</a:t>
+            </a:r>
+            <a:r>
+              <a:rPr lang="en-US" altLang="ja-JP" sz="1700" dirty="0">
+                <a:latin typeface="Calibri" charset="0"/>
+                <a:ea typeface="ＭＳ Ｐゴシック" charset="0"/>
+              </a:rPr>
+              <a:t>, but novel transcripts will also </a:t>
+            </a:r>
+            <a:r>
               <a:rPr lang="en-US" altLang="ja-JP" sz="1700">
                 <a:latin typeface="Calibri" charset="0"/>
                 <a:ea typeface="ＭＳ Ｐゴシック" charset="0"/>
               </a:rPr>
-              <a:t>guide</a:t>
-            </a:r>
-            <a:r>
-              <a:rPr lang="ja-JP" altLang="en-US" sz="1700">
-                <a:latin typeface="Calibri" charset="0"/>
-                <a:ea typeface="ＭＳ Ｐゴシック" charset="0"/>
-              </a:rPr>
-              <a:t>’</a:t>
-            </a:r>
-            <a:r>
-              <a:rPr lang="en-US" altLang="ja-JP" sz="1700">
-                <a:latin typeface="Calibri" charset="0"/>
-                <a:ea typeface="ＭＳ Ｐゴシック" charset="0"/>
-              </a:rPr>
-              <a:t>, but novel transcripts will also be predicted</a:t>
-            </a:r>
+              <a:t>be </a:t>
+            </a:r>
+            <a:r>
+              <a:rPr lang="en-US" altLang="ja-JP" sz="1700" smtClean="0">
+                <a:latin typeface="Calibri" charset="0"/>
+                <a:ea typeface="ＭＳ Ｐゴシック" charset="0"/>
+              </a:rPr>
+              <a:t>predicted.</a:t>
+            </a:r>
+            <a:endParaRPr lang="en-US" altLang="ja-JP" sz="1700" dirty="0">
+              <a:latin typeface="Calibri" charset="0"/>
+              <a:ea typeface="ＭＳ Ｐゴシック" charset="0"/>
+            </a:endParaRPr>
           </a:p>
           <a:p>
             <a:pPr>
@@ -7921,7 +7953,7 @@
               </a:lnSpc>
             </a:pPr>
             <a:r>
-              <a:rPr lang="en-US" sz="2400">
+              <a:rPr lang="en-US" sz="2400" dirty="0">
                 <a:latin typeface="Calibri" charset="0"/>
                 <a:ea typeface="ＭＳ Ｐゴシック" charset="0"/>
               </a:rPr>
@@ -7935,111 +7967,118 @@
               </a:lnSpc>
             </a:pPr>
             <a:r>
-              <a:rPr lang="en-US" sz="2000">
+              <a:rPr lang="en-US" sz="2000" dirty="0">
                 <a:latin typeface="Calibri" charset="0"/>
                 <a:ea typeface="ＭＳ Ｐゴシック" charset="0"/>
               </a:rPr>
               <a:t>Expression values are reported as </a:t>
             </a:r>
             <a:r>
-              <a:rPr lang="ja-JP" altLang="en-US" sz="2000">
+              <a:rPr lang="ja-JP" altLang="en-US" sz="2000" dirty="0">
                 <a:latin typeface="Calibri" charset="0"/>
                 <a:ea typeface="ＭＳ Ｐゴシック" charset="0"/>
               </a:rPr>
               <a:t>‘</a:t>
             </a:r>
             <a:r>
-              <a:rPr lang="en-US" altLang="ja-JP" sz="2000">
+              <a:rPr lang="en-US" altLang="ja-JP" sz="2000" dirty="0">
                 <a:latin typeface="Calibri" charset="0"/>
                 <a:ea typeface="ＭＳ Ｐゴシック" charset="0"/>
               </a:rPr>
               <a:t>FPKM</a:t>
             </a:r>
             <a:r>
-              <a:rPr lang="ja-JP" altLang="en-US" sz="2000">
+              <a:rPr lang="ja-JP" altLang="en-US" sz="2000" dirty="0">
                 <a:latin typeface="Calibri" charset="0"/>
                 <a:ea typeface="ＭＳ Ｐゴシック" charset="0"/>
               </a:rPr>
               <a:t>’</a:t>
             </a:r>
             <a:r>
-              <a:rPr lang="en-US" altLang="ja-JP" sz="2000">
+              <a:rPr lang="en-US" altLang="ja-JP" sz="2000" dirty="0">
                 <a:latin typeface="Calibri" charset="0"/>
                 <a:ea typeface="ＭＳ Ｐゴシック" charset="0"/>
               </a:rPr>
               <a:t>, or </a:t>
             </a:r>
             <a:r>
-              <a:rPr lang="ja-JP" altLang="en-US" sz="2000">
+              <a:rPr lang="ja-JP" altLang="en-US" sz="2000" dirty="0">
                 <a:latin typeface="Calibri" charset="0"/>
                 <a:ea typeface="ＭＳ Ｐゴシック" charset="0"/>
               </a:rPr>
               <a:t>‘</a:t>
             </a:r>
             <a:r>
-              <a:rPr lang="en-US" altLang="ja-JP" sz="2000" b="1">
+              <a:rPr lang="en-US" altLang="ja-JP" sz="2000" b="1" dirty="0">
                 <a:latin typeface="Calibri" charset="0"/>
                 <a:ea typeface="ＭＳ Ｐゴシック" charset="0"/>
               </a:rPr>
               <a:t>F</a:t>
             </a:r>
             <a:r>
-              <a:rPr lang="en-US" altLang="ja-JP" sz="2000">
+              <a:rPr lang="en-US" altLang="ja-JP" sz="2000" dirty="0">
                 <a:latin typeface="Calibri" charset="0"/>
                 <a:ea typeface="ＭＳ Ｐゴシック" charset="0"/>
               </a:rPr>
               <a:t>ragments </a:t>
             </a:r>
             <a:r>
-              <a:rPr lang="en-US" altLang="ja-JP" sz="2000" b="1">
+              <a:rPr lang="en-US" altLang="ja-JP" sz="2000" b="1" dirty="0">
                 <a:latin typeface="Calibri" charset="0"/>
                 <a:ea typeface="ＭＳ Ｐゴシック" charset="0"/>
               </a:rPr>
               <a:t>P</a:t>
             </a:r>
             <a:r>
-              <a:rPr lang="en-US" altLang="ja-JP" sz="2000">
+              <a:rPr lang="en-US" altLang="ja-JP" sz="2000" dirty="0">
                 <a:latin typeface="Calibri" charset="0"/>
                 <a:ea typeface="ＭＳ Ｐゴシック" charset="0"/>
               </a:rPr>
               <a:t>er </a:t>
             </a:r>
             <a:r>
-              <a:rPr lang="en-US" altLang="ja-JP" sz="2000" b="1">
+              <a:rPr lang="en-US" altLang="ja-JP" sz="2000" b="1" dirty="0" err="1">
                 <a:latin typeface="Calibri" charset="0"/>
                 <a:ea typeface="ＭＳ Ｐゴシック" charset="0"/>
               </a:rPr>
               <a:t>K</a:t>
             </a:r>
             <a:r>
-              <a:rPr lang="en-US" altLang="ja-JP" sz="2000">
-                <a:latin typeface="Calibri" charset="0"/>
-                <a:ea typeface="ＭＳ Ｐゴシック" charset="0"/>
-              </a:rPr>
-              <a:t>ilobase of exon per million fragments </a:t>
-            </a:r>
-            <a:r>
-              <a:rPr lang="en-US" altLang="ja-JP" sz="2000" b="1">
+              <a:rPr lang="en-US" altLang="ja-JP" sz="2000" dirty="0" err="1">
+                <a:latin typeface="Calibri" charset="0"/>
+                <a:ea typeface="ＭＳ Ｐゴシック" charset="0"/>
+              </a:rPr>
+              <a:t>ilobase</a:t>
+            </a:r>
+            <a:r>
+              <a:rPr lang="en-US" altLang="ja-JP" sz="2000" dirty="0">
+                <a:latin typeface="Calibri" charset="0"/>
+                <a:ea typeface="ＭＳ Ｐゴシック" charset="0"/>
+              </a:rPr>
+              <a:t> of exon per million fragments </a:t>
+            </a:r>
+            <a:r>
+              <a:rPr lang="en-US" altLang="ja-JP" sz="2000" b="1" dirty="0">
                 <a:latin typeface="Calibri" charset="0"/>
                 <a:ea typeface="ＭＳ Ｐゴシック" charset="0"/>
               </a:rPr>
               <a:t>M</a:t>
             </a:r>
             <a:r>
-              <a:rPr lang="en-US" altLang="ja-JP" sz="2000">
+              <a:rPr lang="en-US" altLang="ja-JP" sz="2000" dirty="0">
                 <a:latin typeface="Calibri" charset="0"/>
                 <a:ea typeface="ＭＳ Ｐゴシック" charset="0"/>
               </a:rPr>
               <a:t>apped</a:t>
             </a:r>
             <a:r>
-              <a:rPr lang="ja-JP" altLang="en-US" sz="2000">
+              <a:rPr lang="ja-JP" altLang="en-US" sz="2000" dirty="0">
                 <a:latin typeface="Calibri" charset="0"/>
                 <a:ea typeface="ＭＳ Ｐゴシック" charset="0"/>
               </a:rPr>
               <a:t>’</a:t>
             </a:r>
-            <a:endParaRPr lang="en-US" altLang="ja-JP" sz="2000">
+            <a:endParaRPr lang="en-US" altLang="ja-JP" sz="2000" dirty="0">
               <a:latin typeface="Calibri" charset="0"/>
               <a:ea typeface="ＭＳ Ｐゴシック" charset="0"/>
             </a:endParaRPr>
@@ -8051,41 +8090,41 @@
               </a:lnSpc>
             </a:pPr>
             <a:r>
-              <a:rPr lang="en-US" sz="2000">
+              <a:rPr lang="en-US" sz="2000" dirty="0">
                 <a:latin typeface="Calibri" charset="0"/>
                 <a:ea typeface="ＭＳ Ｐゴシック" charset="0"/>
               </a:rPr>
               <a:t>Where each </a:t>
             </a:r>
             <a:r>
-              <a:rPr lang="ja-JP" altLang="en-US" sz="2000">
+              <a:rPr lang="ja-JP" altLang="en-US" sz="2000" dirty="0">
                 <a:latin typeface="Calibri" charset="0"/>
                 <a:ea typeface="ＭＳ Ｐゴシック" charset="0"/>
               </a:rPr>
               <a:t>‘</a:t>
             </a:r>
             <a:r>
-              <a:rPr lang="en-US" altLang="ja-JP" sz="2000">
+              <a:rPr lang="en-US" altLang="ja-JP" sz="2000" dirty="0">
                 <a:latin typeface="Calibri" charset="0"/>
                 <a:ea typeface="ＭＳ Ｐゴシック" charset="0"/>
               </a:rPr>
               <a:t>fragment</a:t>
             </a:r>
             <a:r>
-              <a:rPr lang="ja-JP" altLang="en-US" sz="2000">
+              <a:rPr lang="ja-JP" altLang="en-US" sz="2000" dirty="0">
                 <a:latin typeface="Calibri" charset="0"/>
                 <a:ea typeface="ＭＳ Ｐゴシック" charset="0"/>
               </a:rPr>
               <a:t>’</a:t>
             </a:r>
             <a:r>
-              <a:rPr lang="en-US" altLang="ja-JP" sz="2000">
+              <a:rPr lang="en-US" altLang="ja-JP" sz="2000" dirty="0">
                 <a:latin typeface="Calibri" charset="0"/>
                 <a:ea typeface="ＭＳ Ｐゴシック" charset="0"/>
               </a:rPr>
               <a:t> corresponds to a read-pair mapped to the genome</a:t>
             </a:r>
-            <a:endParaRPr lang="en-US" sz="2000">
+            <a:endParaRPr lang="en-US" sz="2000" dirty="0">
               <a:latin typeface="Calibri" charset="0"/>
               <a:ea typeface="ＭＳ Ｐゴシック" charset="0"/>
             </a:endParaRPr>

</xml_diff>